<commit_message>
Updating presentation and sample codes for Week 02
</commit_message>
<xml_diff>
--- a/presentations/02. Algoritma dengan Percabangan.pptx
+++ b/presentations/02. Algoritma dengan Percabangan.pptx
@@ -7,6 +7,9 @@
   <p:sldIdLst>
     <p:sldId id="256" r:id="rId2"/>
     <p:sldId id="257" r:id="rId3"/>
+    <p:sldId id="258" r:id="rId4"/>
+    <p:sldId id="259" r:id="rId5"/>
+    <p:sldId id="260" r:id="rId6"/>
   </p:sldIdLst>
   <p:sldSz cx="9144000" cy="6858000" type="screen4x3"/>
   <p:notesSz cx="6858000" cy="9144000"/>
@@ -105,6 +108,11 @@
       </a:defRPr>
     </a:lvl9pPr>
   </p:defaultTextStyle>
+  <p:extLst>
+    <p:ext uri="{EFAFB233-063F-42B5-8137-9DF3F51BA10A}">
+      <p15:sldGuideLst xmlns:p15="http://schemas.microsoft.com/office/powerpoint/2012/main"/>
+    </p:ext>
+  </p:extLst>
 </p:presentation>
 </file>
 
@@ -3204,6 +3212,697 @@
 </p:sld>
 </file>
 
+<file path=ppt/slides/slide3.xml><?xml version="1.0" encoding="utf-8"?>
+<p:sld xmlns:a="http://schemas.openxmlformats.org/drawingml/2006/main" xmlns:r="http://schemas.openxmlformats.org/officeDocument/2006/relationships" xmlns:p="http://schemas.openxmlformats.org/presentationml/2006/main">
+  <p:cSld>
+    <p:spTree>
+      <p:nvGrpSpPr>
+        <p:cNvPr id="1" name=""/>
+        <p:cNvGrpSpPr/>
+        <p:nvPr/>
+      </p:nvGrpSpPr>
+      <p:grpSpPr>
+        <a:xfrm>
+          <a:off x="0" y="0"/>
+          <a:ext cx="0" cy="0"/>
+          <a:chOff x="0" y="0"/>
+          <a:chExt cx="0" cy="0"/>
+        </a:xfrm>
+      </p:grpSpPr>
+      <p:sp>
+        <p:nvSpPr>
+          <p:cNvPr id="2" name="Title 1"/>
+          <p:cNvSpPr>
+            <a:spLocks noGrp="1"/>
+          </p:cNvSpPr>
+          <p:nvPr>
+            <p:ph type="title"/>
+          </p:nvPr>
+        </p:nvSpPr>
+        <p:spPr/>
+        <p:txBody>
+          <a:bodyPr/>
+          <a:lstStyle/>
+          <a:p>
+            <a:r>
+              <a:rPr lang="en-US" dirty="0" err="1" smtClean="0"/>
+              <a:t>Percabangan</a:t>
+            </a:r>
+            <a:endParaRPr lang="en-US" dirty="0"/>
+          </a:p>
+        </p:txBody>
+      </p:sp>
+      <p:sp>
+        <p:nvSpPr>
+          <p:cNvPr id="3" name="Content Placeholder 2"/>
+          <p:cNvSpPr>
+            <a:spLocks noGrp="1"/>
+          </p:cNvSpPr>
+          <p:nvPr>
+            <p:ph idx="1"/>
+          </p:nvPr>
+        </p:nvSpPr>
+        <p:spPr/>
+        <p:txBody>
+          <a:bodyPr/>
+          <a:lstStyle/>
+          <a:p>
+            <a:r>
+              <a:rPr lang="en-US" dirty="0" err="1" smtClean="0"/>
+              <a:t>Percabangan</a:t>
+            </a:r>
+            <a:r>
+              <a:rPr lang="en-US" dirty="0" smtClean="0"/>
+              <a:t> / </a:t>
+            </a:r>
+            <a:r>
+              <a:rPr lang="en-US" i="1" dirty="0" smtClean="0"/>
+              <a:t>decision</a:t>
+            </a:r>
+            <a:r>
+              <a:rPr lang="en-US" dirty="0" smtClean="0"/>
+              <a:t> </a:t>
+            </a:r>
+            <a:r>
+              <a:rPr lang="en-US" dirty="0" err="1" smtClean="0"/>
+              <a:t>adalah</a:t>
+            </a:r>
+            <a:r>
+              <a:rPr lang="en-US" dirty="0" smtClean="0"/>
+              <a:t> </a:t>
+            </a:r>
+            <a:r>
+              <a:rPr lang="en-US" dirty="0" err="1" smtClean="0"/>
+              <a:t>tahapan</a:t>
+            </a:r>
+            <a:r>
+              <a:rPr lang="en-US" dirty="0" smtClean="0"/>
+              <a:t> </a:t>
+            </a:r>
+            <a:r>
+              <a:rPr lang="en-US" dirty="0" err="1" smtClean="0"/>
+              <a:t>dalam</a:t>
+            </a:r>
+            <a:r>
+              <a:rPr lang="en-US" dirty="0" smtClean="0"/>
+              <a:t> </a:t>
+            </a:r>
+            <a:r>
+              <a:rPr lang="en-US" dirty="0" err="1" smtClean="0"/>
+              <a:t>algoritma</a:t>
+            </a:r>
+            <a:r>
+              <a:rPr lang="en-US" dirty="0" smtClean="0"/>
+              <a:t> yang </a:t>
+            </a:r>
+            <a:r>
+              <a:rPr lang="en-US" dirty="0" err="1" smtClean="0"/>
+              <a:t>berisi</a:t>
+            </a:r>
+            <a:r>
+              <a:rPr lang="en-US" dirty="0" smtClean="0"/>
+              <a:t> </a:t>
+            </a:r>
+            <a:r>
+              <a:rPr lang="en-US" dirty="0" err="1" smtClean="0"/>
+              <a:t>pilihan</a:t>
+            </a:r>
+            <a:r>
+              <a:rPr lang="en-US" dirty="0"/>
+              <a:t> </a:t>
+            </a:r>
+            <a:r>
+              <a:rPr lang="en-US" dirty="0" err="1" smtClean="0"/>
+              <a:t>dan</a:t>
+            </a:r>
+            <a:r>
+              <a:rPr lang="en-US" dirty="0" smtClean="0"/>
+              <a:t> </a:t>
+            </a:r>
+            <a:r>
+              <a:rPr lang="en-US" dirty="0" err="1" smtClean="0"/>
+              <a:t>menentukan</a:t>
+            </a:r>
+            <a:r>
+              <a:rPr lang="en-US" dirty="0" smtClean="0"/>
+              <a:t> </a:t>
+            </a:r>
+            <a:r>
+              <a:rPr lang="en-US" dirty="0" err="1" smtClean="0"/>
+              <a:t>kelanjutan</a:t>
+            </a:r>
+            <a:r>
+              <a:rPr lang="en-US" dirty="0" smtClean="0"/>
+              <a:t> </a:t>
+            </a:r>
+            <a:r>
+              <a:rPr lang="en-US" dirty="0" err="1" smtClean="0"/>
+              <a:t>jalannya</a:t>
+            </a:r>
+            <a:r>
+              <a:rPr lang="en-US" dirty="0" smtClean="0"/>
+              <a:t> </a:t>
+            </a:r>
+            <a:r>
+              <a:rPr lang="en-US" dirty="0" err="1" smtClean="0"/>
+              <a:t>algoritma</a:t>
+            </a:r>
+            <a:endParaRPr lang="en-US" dirty="0" smtClean="0"/>
+          </a:p>
+        </p:txBody>
+      </p:sp>
+    </p:spTree>
+    <p:extLst>
+      <p:ext uri="{BB962C8B-B14F-4D97-AF65-F5344CB8AC3E}">
+        <p14:creationId xmlns:p14="http://schemas.microsoft.com/office/powerpoint/2010/main" val="2383963679"/>
+      </p:ext>
+    </p:extLst>
+  </p:cSld>
+  <p:clrMapOvr>
+    <a:masterClrMapping/>
+  </p:clrMapOvr>
+  <p:timing>
+    <p:tnLst>
+      <p:par>
+        <p:cTn id="1" dur="indefinite" restart="never" nodeType="tmRoot"/>
+      </p:par>
+    </p:tnLst>
+  </p:timing>
+</p:sld>
+</file>
+
+<file path=ppt/slides/slide4.xml><?xml version="1.0" encoding="utf-8"?>
+<p:sld xmlns:a="http://schemas.openxmlformats.org/drawingml/2006/main" xmlns:r="http://schemas.openxmlformats.org/officeDocument/2006/relationships" xmlns:p="http://schemas.openxmlformats.org/presentationml/2006/main">
+  <p:cSld>
+    <p:spTree>
+      <p:nvGrpSpPr>
+        <p:cNvPr id="1" name=""/>
+        <p:cNvGrpSpPr/>
+        <p:nvPr/>
+      </p:nvGrpSpPr>
+      <p:grpSpPr>
+        <a:xfrm>
+          <a:off x="0" y="0"/>
+          <a:ext cx="0" cy="0"/>
+          <a:chOff x="0" y="0"/>
+          <a:chExt cx="0" cy="0"/>
+        </a:xfrm>
+      </p:grpSpPr>
+      <p:sp>
+        <p:nvSpPr>
+          <p:cNvPr id="2" name="Title 1"/>
+          <p:cNvSpPr>
+            <a:spLocks noGrp="1"/>
+          </p:cNvSpPr>
+          <p:nvPr>
+            <p:ph type="title"/>
+          </p:nvPr>
+        </p:nvSpPr>
+        <p:spPr/>
+        <p:txBody>
+          <a:bodyPr/>
+          <a:lstStyle/>
+          <a:p>
+            <a:r>
+              <a:rPr lang="en-US" dirty="0" err="1" smtClean="0"/>
+              <a:t>Simbol</a:t>
+            </a:r>
+            <a:r>
+              <a:rPr lang="en-US" dirty="0" smtClean="0"/>
+              <a:t> </a:t>
+            </a:r>
+            <a:r>
+              <a:rPr lang="en-US" dirty="0" err="1" smtClean="0"/>
+              <a:t>dalam</a:t>
+            </a:r>
+            <a:r>
+              <a:rPr lang="en-US" dirty="0" smtClean="0"/>
+              <a:t> flowchart</a:t>
+            </a:r>
+            <a:endParaRPr lang="en-US" dirty="0"/>
+          </a:p>
+        </p:txBody>
+      </p:sp>
+      <p:sp>
+        <p:nvSpPr>
+          <p:cNvPr id="4" name="Flowchart: Decision 3"/>
+          <p:cNvSpPr/>
+          <p:nvPr/>
+        </p:nvSpPr>
+        <p:spPr>
+          <a:xfrm>
+            <a:off x="3071813" y="3128962"/>
+            <a:ext cx="2714625" cy="2243138"/>
+          </a:xfrm>
+          <a:prstGeom prst="flowChartDecision">
+            <a:avLst/>
+          </a:prstGeom>
+        </p:spPr>
+        <p:style>
+          <a:lnRef idx="2">
+            <a:schemeClr val="accent1">
+              <a:shade val="50000"/>
+            </a:schemeClr>
+          </a:lnRef>
+          <a:fillRef idx="1">
+            <a:schemeClr val="accent1"/>
+          </a:fillRef>
+          <a:effectRef idx="0">
+            <a:schemeClr val="accent1"/>
+          </a:effectRef>
+          <a:fontRef idx="minor">
+            <a:schemeClr val="lt1"/>
+          </a:fontRef>
+        </p:style>
+        <p:txBody>
+          <a:bodyPr rtlCol="0" anchor="ctr"/>
+          <a:lstStyle/>
+          <a:p>
+            <a:pPr algn="ctr"/>
+            <a:r>
+              <a:rPr lang="en-US" dirty="0" err="1" smtClean="0"/>
+              <a:t>Kondisi</a:t>
+            </a:r>
+            <a:endParaRPr lang="en-US" dirty="0"/>
+          </a:p>
+        </p:txBody>
+      </p:sp>
+      <p:cxnSp>
+        <p:nvCxnSpPr>
+          <p:cNvPr id="6" name="Straight Arrow Connector 5"/>
+          <p:cNvCxnSpPr>
+            <a:endCxn id="4" idx="0"/>
+          </p:cNvCxnSpPr>
+          <p:nvPr/>
+        </p:nvCxnSpPr>
+        <p:spPr>
+          <a:xfrm>
+            <a:off x="4429125" y="1931194"/>
+            <a:ext cx="1" cy="1197768"/>
+          </a:xfrm>
+          <a:prstGeom prst="straightConnector1">
+            <a:avLst/>
+          </a:prstGeom>
+          <a:ln w="38100">
+            <a:tailEnd type="triangle"/>
+          </a:ln>
+        </p:spPr>
+        <p:style>
+          <a:lnRef idx="1">
+            <a:schemeClr val="dk1"/>
+          </a:lnRef>
+          <a:fillRef idx="0">
+            <a:schemeClr val="dk1"/>
+          </a:fillRef>
+          <a:effectRef idx="0">
+            <a:schemeClr val="dk1"/>
+          </a:effectRef>
+          <a:fontRef idx="minor">
+            <a:schemeClr val="tx1"/>
+          </a:fontRef>
+        </p:style>
+      </p:cxnSp>
+      <p:cxnSp>
+        <p:nvCxnSpPr>
+          <p:cNvPr id="9" name="Straight Arrow Connector 8"/>
+          <p:cNvCxnSpPr>
+            <a:stCxn id="4" idx="3"/>
+          </p:cNvCxnSpPr>
+          <p:nvPr/>
+        </p:nvCxnSpPr>
+        <p:spPr>
+          <a:xfrm>
+            <a:off x="5786438" y="4250531"/>
+            <a:ext cx="1685925" cy="0"/>
+          </a:xfrm>
+          <a:prstGeom prst="straightConnector1">
+            <a:avLst/>
+          </a:prstGeom>
+          <a:ln w="38100">
+            <a:tailEnd type="triangle"/>
+          </a:ln>
+        </p:spPr>
+        <p:style>
+          <a:lnRef idx="1">
+            <a:schemeClr val="dk1"/>
+          </a:lnRef>
+          <a:fillRef idx="0">
+            <a:schemeClr val="dk1"/>
+          </a:fillRef>
+          <a:effectRef idx="0">
+            <a:schemeClr val="dk1"/>
+          </a:effectRef>
+          <a:fontRef idx="minor">
+            <a:schemeClr val="tx1"/>
+          </a:fontRef>
+        </p:style>
+      </p:cxnSp>
+      <p:cxnSp>
+        <p:nvCxnSpPr>
+          <p:cNvPr id="12" name="Straight Arrow Connector 11"/>
+          <p:cNvCxnSpPr/>
+          <p:nvPr/>
+        </p:nvCxnSpPr>
+        <p:spPr>
+          <a:xfrm flipH="1">
+            <a:off x="1443038" y="4250531"/>
+            <a:ext cx="1628775" cy="0"/>
+          </a:xfrm>
+          <a:prstGeom prst="straightConnector1">
+            <a:avLst/>
+          </a:prstGeom>
+          <a:ln w="38100">
+            <a:tailEnd type="triangle"/>
+          </a:ln>
+        </p:spPr>
+        <p:style>
+          <a:lnRef idx="1">
+            <a:schemeClr val="dk1"/>
+          </a:lnRef>
+          <a:fillRef idx="0">
+            <a:schemeClr val="dk1"/>
+          </a:fillRef>
+          <a:effectRef idx="0">
+            <a:schemeClr val="dk1"/>
+          </a:effectRef>
+          <a:fontRef idx="minor">
+            <a:schemeClr val="tx1"/>
+          </a:fontRef>
+        </p:style>
+      </p:cxnSp>
+      <p:sp>
+        <p:nvSpPr>
+          <p:cNvPr id="14" name="TextBox 13"/>
+          <p:cNvSpPr txBox="1"/>
+          <p:nvPr/>
+        </p:nvSpPr>
+        <p:spPr>
+          <a:xfrm>
+            <a:off x="4572000" y="2198846"/>
+            <a:ext cx="2422202" cy="369332"/>
+          </a:xfrm>
+          <a:prstGeom prst="rect">
+            <a:avLst/>
+          </a:prstGeom>
+          <a:noFill/>
+        </p:spPr>
+        <p:txBody>
+          <a:bodyPr wrap="none" rtlCol="0">
+            <a:spAutoFit/>
+          </a:bodyPr>
+          <a:lstStyle/>
+          <a:p>
+            <a:r>
+              <a:rPr lang="en-US" dirty="0" smtClean="0"/>
+              <a:t>Dari proses </a:t>
+            </a:r>
+            <a:r>
+              <a:rPr lang="en-US" dirty="0" err="1" smtClean="0"/>
+              <a:t>sebelumnya</a:t>
+            </a:r>
+            <a:endParaRPr lang="en-US" dirty="0"/>
+          </a:p>
+        </p:txBody>
+      </p:sp>
+      <p:sp>
+        <p:nvSpPr>
+          <p:cNvPr id="15" name="TextBox 14"/>
+          <p:cNvSpPr txBox="1"/>
+          <p:nvPr/>
+        </p:nvSpPr>
+        <p:spPr>
+          <a:xfrm>
+            <a:off x="1764341" y="3700820"/>
+            <a:ext cx="986167" cy="369332"/>
+          </a:xfrm>
+          <a:prstGeom prst="rect">
+            <a:avLst/>
+          </a:prstGeom>
+          <a:noFill/>
+        </p:spPr>
+        <p:txBody>
+          <a:bodyPr wrap="none" rtlCol="0">
+            <a:spAutoFit/>
+          </a:bodyPr>
+          <a:lstStyle/>
+          <a:p>
+            <a:r>
+              <a:rPr lang="en-US" dirty="0" err="1" smtClean="0"/>
+              <a:t>Pilihan</a:t>
+            </a:r>
+            <a:r>
+              <a:rPr lang="en-US" dirty="0" smtClean="0"/>
+              <a:t> 1</a:t>
+            </a:r>
+            <a:endParaRPr lang="en-US" dirty="0"/>
+          </a:p>
+        </p:txBody>
+      </p:sp>
+      <p:sp>
+        <p:nvSpPr>
+          <p:cNvPr id="16" name="TextBox 15"/>
+          <p:cNvSpPr txBox="1"/>
+          <p:nvPr/>
+        </p:nvSpPr>
+        <p:spPr>
+          <a:xfrm>
+            <a:off x="6107743" y="3700820"/>
+            <a:ext cx="986167" cy="369332"/>
+          </a:xfrm>
+          <a:prstGeom prst="rect">
+            <a:avLst/>
+          </a:prstGeom>
+          <a:noFill/>
+        </p:spPr>
+        <p:txBody>
+          <a:bodyPr wrap="none" rtlCol="0">
+            <a:spAutoFit/>
+          </a:bodyPr>
+          <a:lstStyle/>
+          <a:p>
+            <a:r>
+              <a:rPr lang="en-US" dirty="0" err="1" smtClean="0"/>
+              <a:t>Pilihan</a:t>
+            </a:r>
+            <a:r>
+              <a:rPr lang="en-US" dirty="0" smtClean="0"/>
+              <a:t> 2</a:t>
+            </a:r>
+            <a:endParaRPr lang="en-US" dirty="0"/>
+          </a:p>
+        </p:txBody>
+      </p:sp>
+      <p:sp>
+        <p:nvSpPr>
+          <p:cNvPr id="17" name="TextBox 16"/>
+          <p:cNvSpPr txBox="1"/>
+          <p:nvPr/>
+        </p:nvSpPr>
+        <p:spPr>
+          <a:xfrm>
+            <a:off x="1764341" y="4313754"/>
+            <a:ext cx="691215" cy="369332"/>
+          </a:xfrm>
+          <a:prstGeom prst="rect">
+            <a:avLst/>
+          </a:prstGeom>
+          <a:noFill/>
+        </p:spPr>
+        <p:txBody>
+          <a:bodyPr wrap="none" rtlCol="0">
+            <a:spAutoFit/>
+          </a:bodyPr>
+          <a:lstStyle/>
+          <a:p>
+            <a:r>
+              <a:rPr lang="en-US" b="1" dirty="0" smtClean="0"/>
+              <a:t>TRUE</a:t>
+            </a:r>
+            <a:endParaRPr lang="en-US" b="1" dirty="0"/>
+          </a:p>
+        </p:txBody>
+      </p:sp>
+      <p:sp>
+        <p:nvSpPr>
+          <p:cNvPr id="18" name="TextBox 17"/>
+          <p:cNvSpPr txBox="1"/>
+          <p:nvPr/>
+        </p:nvSpPr>
+        <p:spPr>
+          <a:xfrm>
+            <a:off x="6232905" y="4284108"/>
+            <a:ext cx="735842" cy="369332"/>
+          </a:xfrm>
+          <a:prstGeom prst="rect">
+            <a:avLst/>
+          </a:prstGeom>
+          <a:noFill/>
+        </p:spPr>
+        <p:txBody>
+          <a:bodyPr wrap="none" rtlCol="0">
+            <a:spAutoFit/>
+          </a:bodyPr>
+          <a:lstStyle/>
+          <a:p>
+            <a:r>
+              <a:rPr lang="en-US" b="1" dirty="0" smtClean="0"/>
+              <a:t>FALSE</a:t>
+            </a:r>
+            <a:endParaRPr lang="en-US" b="1" dirty="0"/>
+          </a:p>
+        </p:txBody>
+      </p:sp>
+    </p:spTree>
+    <p:extLst>
+      <p:ext uri="{BB962C8B-B14F-4D97-AF65-F5344CB8AC3E}">
+        <p14:creationId xmlns:p14="http://schemas.microsoft.com/office/powerpoint/2010/main" val="2898863002"/>
+      </p:ext>
+    </p:extLst>
+  </p:cSld>
+  <p:clrMapOvr>
+    <a:masterClrMapping/>
+  </p:clrMapOvr>
+  <p:timing>
+    <p:tnLst>
+      <p:par>
+        <p:cTn id="1" dur="indefinite" restart="never" nodeType="tmRoot"/>
+      </p:par>
+    </p:tnLst>
+  </p:timing>
+</p:sld>
+</file>
+
+<file path=ppt/slides/slide5.xml><?xml version="1.0" encoding="utf-8"?>
+<p:sld xmlns:a="http://schemas.openxmlformats.org/drawingml/2006/main" xmlns:r="http://schemas.openxmlformats.org/officeDocument/2006/relationships" xmlns:p="http://schemas.openxmlformats.org/presentationml/2006/main">
+  <p:cSld>
+    <p:spTree>
+      <p:nvGrpSpPr>
+        <p:cNvPr id="1" name=""/>
+        <p:cNvGrpSpPr/>
+        <p:nvPr/>
+      </p:nvGrpSpPr>
+      <p:grpSpPr>
+        <a:xfrm>
+          <a:off x="0" y="0"/>
+          <a:ext cx="0" cy="0"/>
+          <a:chOff x="0" y="0"/>
+          <a:chExt cx="0" cy="0"/>
+        </a:xfrm>
+      </p:grpSpPr>
+      <p:sp>
+        <p:nvSpPr>
+          <p:cNvPr id="2" name="Title 1"/>
+          <p:cNvSpPr>
+            <a:spLocks noGrp="1"/>
+          </p:cNvSpPr>
+          <p:nvPr>
+            <p:ph type="title"/>
+          </p:nvPr>
+        </p:nvSpPr>
+        <p:spPr/>
+        <p:txBody>
+          <a:bodyPr/>
+          <a:lstStyle/>
+          <a:p>
+            <a:r>
+              <a:rPr lang="en-US" dirty="0" err="1" smtClean="0"/>
+              <a:t>Contoh-contoh</a:t>
+            </a:r>
+            <a:r>
+              <a:rPr lang="en-US" dirty="0" smtClean="0"/>
+              <a:t> </a:t>
+            </a:r>
+            <a:r>
+              <a:rPr lang="en-US" dirty="0" err="1" smtClean="0"/>
+              <a:t>dalam</a:t>
+            </a:r>
+            <a:r>
+              <a:rPr lang="en-US" dirty="0" smtClean="0"/>
+              <a:t> </a:t>
+            </a:r>
+            <a:r>
+              <a:rPr lang="en-US" dirty="0" err="1" smtClean="0"/>
+              <a:t>soal</a:t>
+            </a:r>
+            <a:endParaRPr lang="en-US" dirty="0"/>
+          </a:p>
+        </p:txBody>
+      </p:sp>
+      <p:sp>
+        <p:nvSpPr>
+          <p:cNvPr id="3" name="Content Placeholder 2"/>
+          <p:cNvSpPr>
+            <a:spLocks noGrp="1"/>
+          </p:cNvSpPr>
+          <p:nvPr>
+            <p:ph idx="1"/>
+          </p:nvPr>
+        </p:nvSpPr>
+        <p:spPr/>
+        <p:txBody>
+          <a:bodyPr>
+            <a:normAutofit/>
+          </a:bodyPr>
+          <a:lstStyle/>
+          <a:p>
+            <a:r>
+              <a:rPr lang="en-US" sz="2000" dirty="0">
+                <a:hlinkClick r:id="rId2"/>
+              </a:rPr>
+              <a:t>http://www.w3resource.com/c-programming-exercises/conditional-statement</a:t>
+            </a:r>
+            <a:r>
+              <a:rPr lang="en-US" sz="2000" dirty="0" smtClean="0">
+                <a:hlinkClick r:id="rId2"/>
+              </a:rPr>
+              <a:t>/</a:t>
+            </a:r>
+            <a:r>
+              <a:rPr lang="en-US" sz="2000" dirty="0" smtClean="0"/>
+              <a:t> </a:t>
+            </a:r>
+          </a:p>
+          <a:p>
+            <a:r>
+              <a:rPr lang="en-US" sz="2000" dirty="0">
+                <a:hlinkClick r:id="rId3"/>
+              </a:rPr>
+              <a:t>http://</a:t>
+            </a:r>
+            <a:r>
+              <a:rPr lang="en-US" sz="2000" dirty="0" smtClean="0">
+                <a:hlinkClick r:id="rId3"/>
+              </a:rPr>
+              <a:t>www.codeforwin.in/2015/05/if-else-programming-practice.html</a:t>
+            </a:r>
+            <a:r>
+              <a:rPr lang="en-US" sz="2000" dirty="0" smtClean="0"/>
+              <a:t> </a:t>
+            </a:r>
+            <a:endParaRPr lang="en-US" sz="2000" dirty="0"/>
+          </a:p>
+        </p:txBody>
+      </p:sp>
+    </p:spTree>
+    <p:extLst>
+      <p:ext uri="{BB962C8B-B14F-4D97-AF65-F5344CB8AC3E}">
+        <p14:creationId xmlns:p14="http://schemas.microsoft.com/office/powerpoint/2010/main" val="482456727"/>
+      </p:ext>
+    </p:extLst>
+  </p:cSld>
+  <p:clrMapOvr>
+    <a:masterClrMapping/>
+  </p:clrMapOvr>
+  <p:timing>
+    <p:tnLst>
+      <p:par>
+        <p:cTn id="1" dur="indefinite" restart="never" nodeType="tmRoot"/>
+      </p:par>
+    </p:tnLst>
+  </p:timing>
+</p:sld>
+</file>
+
 <file path=ppt/theme/theme1.xml><?xml version="1.0" encoding="utf-8"?>
 <a:theme xmlns:a="http://schemas.openxmlformats.org/drawingml/2006/main" name="Lato-OpenSans">
   <a:themeElements>

</xml_diff>